<commit_message>
Add some explanations in Algorithm part
</commit_message>
<xml_diff>
--- a/PPT/Week 03_1 Asynchronous Methods for Deep Reinforcement Learning.pptx
+++ b/PPT/Week 03_1 Asynchronous Methods for Deep Reinforcement Learning.pptx
@@ -3737,6 +3737,272 @@
           </a:prstGeom>
         </p:spPr>
       </p:pic>
+      <p:sp>
+        <p:nvSpPr>
+          <p:cNvPr id="5" name="직사각형 4"/>
+          <p:cNvSpPr/>
+          <p:nvPr/>
+        </p:nvSpPr>
+        <p:spPr>
+          <a:xfrm>
+            <a:off x="685800" y="1881554"/>
+            <a:ext cx="6312877" cy="395654"/>
+          </a:xfrm>
+          <a:prstGeom prst="rect">
+            <a:avLst/>
+          </a:prstGeom>
+          <a:noFill/>
+          <a:ln w="38100">
+            <a:solidFill>
+              <a:srgbClr val="FF0000"/>
+            </a:solidFill>
+          </a:ln>
+        </p:spPr>
+        <p:style>
+          <a:lnRef idx="2">
+            <a:schemeClr val="dk1"/>
+          </a:lnRef>
+          <a:fillRef idx="1">
+            <a:schemeClr val="lt1"/>
+          </a:fillRef>
+          <a:effectRef idx="0">
+            <a:schemeClr val="dk1"/>
+          </a:effectRef>
+          <a:fontRef idx="minor">
+            <a:schemeClr val="dk1"/>
+          </a:fontRef>
+        </p:style>
+        <p:txBody>
+          <a:bodyPr rtlCol="0" anchor="ctr"/>
+          <a:lstStyle/>
+          <a:p>
+            <a:pPr algn="ctr"/>
+            <a:endParaRPr lang="ko-KR" altLang="en-US"/>
+          </a:p>
+        </p:txBody>
+      </p:sp>
+      <p:sp>
+        <p:nvSpPr>
+          <p:cNvPr id="6" name="TextBox 5"/>
+          <p:cNvSpPr txBox="1"/>
+          <p:nvPr/>
+        </p:nvSpPr>
+        <p:spPr>
+          <a:xfrm>
+            <a:off x="7218470" y="1863970"/>
+            <a:ext cx="1735382" cy="523220"/>
+          </a:xfrm>
+          <a:prstGeom prst="rect">
+            <a:avLst/>
+          </a:prstGeom>
+          <a:noFill/>
+        </p:spPr>
+        <p:txBody>
+          <a:bodyPr wrap="square" rtlCol="0">
+            <a:spAutoFit/>
+          </a:bodyPr>
+          <a:lstStyle/>
+          <a:p>
+            <a:r>
+              <a:rPr lang="en-US" altLang="ko-KR" sz="1400" b="1" dirty="0" smtClean="0">
+                <a:solidFill>
+                  <a:srgbClr val="FF0000"/>
+                </a:solidFill>
+              </a:rPr>
+              <a:t>Shared model, </a:t>
+            </a:r>
+          </a:p>
+          <a:p>
+            <a:r>
+              <a:rPr lang="en-US" altLang="ko-KR" sz="1400" b="1" dirty="0" smtClean="0">
+                <a:solidFill>
+                  <a:srgbClr val="FF0000"/>
+                </a:solidFill>
+              </a:rPr>
+              <a:t>Each agent model</a:t>
+            </a:r>
+            <a:endParaRPr lang="ko-KR" altLang="en-US" sz="1400" b="1" dirty="0">
+              <a:solidFill>
+                <a:srgbClr val="FF0000"/>
+              </a:solidFill>
+            </a:endParaRPr>
+          </a:p>
+        </p:txBody>
+      </p:sp>
+      <p:sp>
+        <p:nvSpPr>
+          <p:cNvPr id="7" name="직사각형 6"/>
+          <p:cNvSpPr/>
+          <p:nvPr/>
+        </p:nvSpPr>
+        <p:spPr>
+          <a:xfrm>
+            <a:off x="987670" y="2854242"/>
+            <a:ext cx="4402016" cy="216000"/>
+          </a:xfrm>
+          <a:prstGeom prst="rect">
+            <a:avLst/>
+          </a:prstGeom>
+          <a:noFill/>
+          <a:ln w="38100">
+            <a:solidFill>
+              <a:srgbClr val="FF0000"/>
+            </a:solidFill>
+          </a:ln>
+        </p:spPr>
+        <p:style>
+          <a:lnRef idx="2">
+            <a:schemeClr val="dk1"/>
+          </a:lnRef>
+          <a:fillRef idx="1">
+            <a:schemeClr val="lt1"/>
+          </a:fillRef>
+          <a:effectRef idx="0">
+            <a:schemeClr val="dk1"/>
+          </a:effectRef>
+          <a:fontRef idx="minor">
+            <a:schemeClr val="dk1"/>
+          </a:fontRef>
+        </p:style>
+        <p:txBody>
+          <a:bodyPr rtlCol="0" anchor="ctr"/>
+          <a:lstStyle/>
+          <a:p>
+            <a:pPr algn="ctr"/>
+            <a:endParaRPr lang="ko-KR" altLang="en-US"/>
+          </a:p>
+        </p:txBody>
+      </p:sp>
+      <p:sp>
+        <p:nvSpPr>
+          <p:cNvPr id="8" name="TextBox 7"/>
+          <p:cNvSpPr txBox="1"/>
+          <p:nvPr/>
+        </p:nvSpPr>
+        <p:spPr>
+          <a:xfrm>
+            <a:off x="5483088" y="2808632"/>
+            <a:ext cx="1735382" cy="307777"/>
+          </a:xfrm>
+          <a:prstGeom prst="rect">
+            <a:avLst/>
+          </a:prstGeom>
+          <a:noFill/>
+        </p:spPr>
+        <p:txBody>
+          <a:bodyPr wrap="square" rtlCol="0">
+            <a:spAutoFit/>
+          </a:bodyPr>
+          <a:lstStyle/>
+          <a:p>
+            <a:r>
+              <a:rPr lang="en-US" altLang="ko-KR" sz="1400" b="1" dirty="0" smtClean="0">
+                <a:solidFill>
+                  <a:srgbClr val="FF0000"/>
+                </a:solidFill>
+              </a:rPr>
+              <a:t>Synchronize</a:t>
+            </a:r>
+            <a:endParaRPr lang="ko-KR" altLang="en-US" sz="1400" b="1" dirty="0">
+              <a:solidFill>
+                <a:srgbClr val="FF0000"/>
+              </a:solidFill>
+            </a:endParaRPr>
+          </a:p>
+        </p:txBody>
+      </p:sp>
+      <p:sp>
+        <p:nvSpPr>
+          <p:cNvPr id="9" name="직사각형 8"/>
+          <p:cNvSpPr/>
+          <p:nvPr/>
+        </p:nvSpPr>
+        <p:spPr>
+          <a:xfrm>
+            <a:off x="987669" y="5055248"/>
+            <a:ext cx="6011007" cy="1240043"/>
+          </a:xfrm>
+          <a:prstGeom prst="rect">
+            <a:avLst/>
+          </a:prstGeom>
+          <a:noFill/>
+          <a:ln w="38100">
+            <a:solidFill>
+              <a:srgbClr val="FF0000"/>
+            </a:solidFill>
+          </a:ln>
+        </p:spPr>
+        <p:style>
+          <a:lnRef idx="2">
+            <a:schemeClr val="dk1"/>
+          </a:lnRef>
+          <a:fillRef idx="1">
+            <a:schemeClr val="lt1"/>
+          </a:fillRef>
+          <a:effectRef idx="0">
+            <a:schemeClr val="dk1"/>
+          </a:effectRef>
+          <a:fontRef idx="minor">
+            <a:schemeClr val="dk1"/>
+          </a:fontRef>
+        </p:style>
+        <p:txBody>
+          <a:bodyPr rtlCol="0" anchor="ctr"/>
+          <a:lstStyle/>
+          <a:p>
+            <a:pPr algn="ctr"/>
+            <a:endParaRPr lang="ko-KR" altLang="en-US"/>
+          </a:p>
+        </p:txBody>
+      </p:sp>
+      <p:sp>
+        <p:nvSpPr>
+          <p:cNvPr id="10" name="TextBox 9"/>
+          <p:cNvSpPr txBox="1"/>
+          <p:nvPr/>
+        </p:nvSpPr>
+        <p:spPr>
+          <a:xfrm>
+            <a:off x="7121388" y="5373001"/>
+            <a:ext cx="1626958" cy="523220"/>
+          </a:xfrm>
+          <a:prstGeom prst="rect">
+            <a:avLst/>
+          </a:prstGeom>
+          <a:noFill/>
+        </p:spPr>
+        <p:txBody>
+          <a:bodyPr wrap="square" rtlCol="0">
+            <a:spAutoFit/>
+          </a:bodyPr>
+          <a:lstStyle/>
+          <a:p>
+            <a:r>
+              <a:rPr lang="en-US" altLang="ko-KR" sz="1400" b="1" dirty="0" smtClean="0">
+                <a:solidFill>
+                  <a:srgbClr val="FF0000"/>
+                </a:solidFill>
+              </a:rPr>
+              <a:t>Update </a:t>
+            </a:r>
+          </a:p>
+          <a:p>
+            <a:r>
+              <a:rPr lang="en-US" altLang="ko-KR" sz="1400" b="1" dirty="0" smtClean="0">
+                <a:solidFill>
+                  <a:srgbClr val="FF0000"/>
+                </a:solidFill>
+              </a:rPr>
+              <a:t>shared model</a:t>
+            </a:r>
+            <a:endParaRPr lang="ko-KR" altLang="en-US" sz="1400" b="1" dirty="0">
+              <a:solidFill>
+                <a:srgbClr val="FF0000"/>
+              </a:solidFill>
+            </a:endParaRPr>
+          </a:p>
+        </p:txBody>
+      </p:sp>
     </p:spTree>
     <p:extLst>
       <p:ext uri="{BB962C8B-B14F-4D97-AF65-F5344CB8AC3E}">
@@ -10704,6 +10970,700 @@
           </a:prstGeom>
         </p:spPr>
       </p:pic>
+      <p:sp>
+        <p:nvSpPr>
+          <p:cNvPr id="2" name="직사각형 1"/>
+          <p:cNvSpPr/>
+          <p:nvPr/>
+        </p:nvSpPr>
+        <p:spPr>
+          <a:xfrm>
+            <a:off x="518746" y="2039815"/>
+            <a:ext cx="3859823" cy="246185"/>
+          </a:xfrm>
+          <a:prstGeom prst="rect">
+            <a:avLst/>
+          </a:prstGeom>
+          <a:noFill/>
+          <a:ln w="38100">
+            <a:solidFill>
+              <a:srgbClr val="FF0000"/>
+            </a:solidFill>
+          </a:ln>
+        </p:spPr>
+        <p:style>
+          <a:lnRef idx="2">
+            <a:schemeClr val="dk1"/>
+          </a:lnRef>
+          <a:fillRef idx="1">
+            <a:schemeClr val="lt1"/>
+          </a:fillRef>
+          <a:effectRef idx="0">
+            <a:schemeClr val="dk1"/>
+          </a:effectRef>
+          <a:fontRef idx="minor">
+            <a:schemeClr val="dk1"/>
+          </a:fontRef>
+        </p:style>
+        <p:txBody>
+          <a:bodyPr rtlCol="0" anchor="ctr"/>
+          <a:lstStyle/>
+          <a:p>
+            <a:pPr algn="ctr"/>
+            <a:endParaRPr lang="ko-KR" altLang="en-US"/>
+          </a:p>
+        </p:txBody>
+      </p:sp>
+      <p:sp>
+        <p:nvSpPr>
+          <p:cNvPr id="6" name="직사각형 5"/>
+          <p:cNvSpPr/>
+          <p:nvPr/>
+        </p:nvSpPr>
+        <p:spPr>
+          <a:xfrm>
+            <a:off x="879231" y="4730262"/>
+            <a:ext cx="2971799" cy="592014"/>
+          </a:xfrm>
+          <a:prstGeom prst="rect">
+            <a:avLst/>
+          </a:prstGeom>
+          <a:noFill/>
+          <a:ln w="38100">
+            <a:solidFill>
+              <a:srgbClr val="FF0000"/>
+            </a:solidFill>
+          </a:ln>
+        </p:spPr>
+        <p:style>
+          <a:lnRef idx="2">
+            <a:schemeClr val="dk1"/>
+          </a:lnRef>
+          <a:fillRef idx="1">
+            <a:schemeClr val="lt1"/>
+          </a:fillRef>
+          <a:effectRef idx="0">
+            <a:schemeClr val="dk1"/>
+          </a:effectRef>
+          <a:fontRef idx="minor">
+            <a:schemeClr val="dk1"/>
+          </a:fontRef>
+        </p:style>
+        <p:txBody>
+          <a:bodyPr rtlCol="0" anchor="ctr"/>
+          <a:lstStyle/>
+          <a:p>
+            <a:pPr algn="ctr"/>
+            <a:endParaRPr lang="ko-KR" altLang="en-US"/>
+          </a:p>
+        </p:txBody>
+      </p:sp>
+      <p:sp>
+        <p:nvSpPr>
+          <p:cNvPr id="7" name="직사각형 6"/>
+          <p:cNvSpPr/>
+          <p:nvPr/>
+        </p:nvSpPr>
+        <p:spPr>
+          <a:xfrm>
+            <a:off x="879231" y="5322276"/>
+            <a:ext cx="3745524" cy="788378"/>
+          </a:xfrm>
+          <a:prstGeom prst="rect">
+            <a:avLst/>
+          </a:prstGeom>
+          <a:noFill/>
+          <a:ln w="38100">
+            <a:solidFill>
+              <a:srgbClr val="FF0000"/>
+            </a:solidFill>
+          </a:ln>
+        </p:spPr>
+        <p:style>
+          <a:lnRef idx="2">
+            <a:schemeClr val="dk1"/>
+          </a:lnRef>
+          <a:fillRef idx="1">
+            <a:schemeClr val="lt1"/>
+          </a:fillRef>
+          <a:effectRef idx="0">
+            <a:schemeClr val="dk1"/>
+          </a:effectRef>
+          <a:fontRef idx="minor">
+            <a:schemeClr val="dk1"/>
+          </a:fontRef>
+        </p:style>
+        <p:txBody>
+          <a:bodyPr rtlCol="0" anchor="ctr"/>
+          <a:lstStyle/>
+          <a:p>
+            <a:pPr algn="ctr"/>
+            <a:endParaRPr lang="ko-KR" altLang="en-US"/>
+          </a:p>
+        </p:txBody>
+      </p:sp>
+      <p:sp>
+        <p:nvSpPr>
+          <p:cNvPr id="8" name="직사각형 7"/>
+          <p:cNvSpPr/>
+          <p:nvPr/>
+        </p:nvSpPr>
+        <p:spPr>
+          <a:xfrm>
+            <a:off x="5753100" y="1793630"/>
+            <a:ext cx="3012832" cy="492370"/>
+          </a:xfrm>
+          <a:prstGeom prst="rect">
+            <a:avLst/>
+          </a:prstGeom>
+          <a:noFill/>
+          <a:ln w="38100">
+            <a:solidFill>
+              <a:srgbClr val="FF0000"/>
+            </a:solidFill>
+          </a:ln>
+        </p:spPr>
+        <p:style>
+          <a:lnRef idx="2">
+            <a:schemeClr val="dk1"/>
+          </a:lnRef>
+          <a:fillRef idx="1">
+            <a:schemeClr val="lt1"/>
+          </a:fillRef>
+          <a:effectRef idx="0">
+            <a:schemeClr val="dk1"/>
+          </a:effectRef>
+          <a:fontRef idx="minor">
+            <a:schemeClr val="dk1"/>
+          </a:fontRef>
+        </p:style>
+        <p:txBody>
+          <a:bodyPr rtlCol="0" anchor="ctr"/>
+          <a:lstStyle/>
+          <a:p>
+            <a:pPr algn="ctr"/>
+            <a:endParaRPr lang="ko-KR" altLang="en-US"/>
+          </a:p>
+        </p:txBody>
+      </p:sp>
+      <p:sp>
+        <p:nvSpPr>
+          <p:cNvPr id="9" name="직사각형 8"/>
+          <p:cNvSpPr/>
+          <p:nvPr/>
+        </p:nvSpPr>
+        <p:spPr>
+          <a:xfrm>
+            <a:off x="5961185" y="3185140"/>
+            <a:ext cx="2743200" cy="180000"/>
+          </a:xfrm>
+          <a:prstGeom prst="rect">
+            <a:avLst/>
+          </a:prstGeom>
+          <a:noFill/>
+          <a:ln w="38100">
+            <a:solidFill>
+              <a:srgbClr val="FF0000"/>
+            </a:solidFill>
+          </a:ln>
+        </p:spPr>
+        <p:style>
+          <a:lnRef idx="2">
+            <a:schemeClr val="dk1"/>
+          </a:lnRef>
+          <a:fillRef idx="1">
+            <a:schemeClr val="lt1"/>
+          </a:fillRef>
+          <a:effectRef idx="0">
+            <a:schemeClr val="dk1"/>
+          </a:effectRef>
+          <a:fontRef idx="minor">
+            <a:schemeClr val="dk1"/>
+          </a:fontRef>
+        </p:style>
+        <p:txBody>
+          <a:bodyPr rtlCol="0" anchor="ctr"/>
+          <a:lstStyle/>
+          <a:p>
+            <a:pPr algn="ctr"/>
+            <a:endParaRPr lang="ko-KR" altLang="en-US"/>
+          </a:p>
+        </p:txBody>
+      </p:sp>
+      <p:sp>
+        <p:nvSpPr>
+          <p:cNvPr id="10" name="직사각형 9"/>
+          <p:cNvSpPr/>
+          <p:nvPr/>
+        </p:nvSpPr>
+        <p:spPr>
+          <a:xfrm>
+            <a:off x="5961186" y="4903176"/>
+            <a:ext cx="3622430" cy="829409"/>
+          </a:xfrm>
+          <a:prstGeom prst="rect">
+            <a:avLst/>
+          </a:prstGeom>
+          <a:noFill/>
+          <a:ln w="38100">
+            <a:solidFill>
+              <a:srgbClr val="FF0000"/>
+            </a:solidFill>
+          </a:ln>
+        </p:spPr>
+        <p:style>
+          <a:lnRef idx="2">
+            <a:schemeClr val="dk1"/>
+          </a:lnRef>
+          <a:fillRef idx="1">
+            <a:schemeClr val="lt1"/>
+          </a:fillRef>
+          <a:effectRef idx="0">
+            <a:schemeClr val="dk1"/>
+          </a:effectRef>
+          <a:fontRef idx="minor">
+            <a:schemeClr val="dk1"/>
+          </a:fontRef>
+        </p:style>
+        <p:txBody>
+          <a:bodyPr rtlCol="0" anchor="ctr"/>
+          <a:lstStyle/>
+          <a:p>
+            <a:pPr algn="ctr"/>
+            <a:endParaRPr lang="ko-KR" altLang="en-US"/>
+          </a:p>
+        </p:txBody>
+      </p:sp>
+      <p:sp>
+        <p:nvSpPr>
+          <p:cNvPr id="11" name="직사각형 10"/>
+          <p:cNvSpPr/>
+          <p:nvPr/>
+        </p:nvSpPr>
+        <p:spPr>
+          <a:xfrm>
+            <a:off x="5961185" y="5732585"/>
+            <a:ext cx="1872761" cy="482453"/>
+          </a:xfrm>
+          <a:prstGeom prst="rect">
+            <a:avLst/>
+          </a:prstGeom>
+          <a:noFill/>
+          <a:ln w="38100">
+            <a:solidFill>
+              <a:srgbClr val="FF0000"/>
+            </a:solidFill>
+          </a:ln>
+        </p:spPr>
+        <p:style>
+          <a:lnRef idx="2">
+            <a:schemeClr val="dk1"/>
+          </a:lnRef>
+          <a:fillRef idx="1">
+            <a:schemeClr val="lt1"/>
+          </a:fillRef>
+          <a:effectRef idx="0">
+            <a:schemeClr val="dk1"/>
+          </a:effectRef>
+          <a:fontRef idx="minor">
+            <a:schemeClr val="dk1"/>
+          </a:fontRef>
+        </p:style>
+        <p:txBody>
+          <a:bodyPr rtlCol="0" anchor="ctr"/>
+          <a:lstStyle/>
+          <a:p>
+            <a:pPr algn="ctr"/>
+            <a:endParaRPr lang="ko-KR" altLang="en-US"/>
+          </a:p>
+        </p:txBody>
+      </p:sp>
+      <p:sp>
+        <p:nvSpPr>
+          <p:cNvPr id="12" name="TextBox 11"/>
+          <p:cNvSpPr txBox="1"/>
+          <p:nvPr/>
+        </p:nvSpPr>
+        <p:spPr>
+          <a:xfrm>
+            <a:off x="3775346" y="2286000"/>
+            <a:ext cx="1452206" cy="307777"/>
+          </a:xfrm>
+          <a:prstGeom prst="rect">
+            <a:avLst/>
+          </a:prstGeom>
+          <a:noFill/>
+        </p:spPr>
+        <p:txBody>
+          <a:bodyPr wrap="square" rtlCol="0">
+            <a:spAutoFit/>
+          </a:bodyPr>
+          <a:lstStyle/>
+          <a:p>
+            <a:r>
+              <a:rPr lang="en-US" altLang="ko-KR" sz="1400" b="1" dirty="0">
+                <a:solidFill>
+                  <a:srgbClr val="FF0000"/>
+                </a:solidFill>
+              </a:rPr>
+              <a:t>S</a:t>
+            </a:r>
+            <a:r>
+              <a:rPr lang="en-US" altLang="ko-KR" sz="1400" b="1" dirty="0" smtClean="0">
+                <a:solidFill>
+                  <a:srgbClr val="FF0000"/>
+                </a:solidFill>
+              </a:rPr>
+              <a:t>hared models</a:t>
+            </a:r>
+            <a:endParaRPr lang="ko-KR" altLang="en-US" sz="1400" b="1" dirty="0">
+              <a:solidFill>
+                <a:srgbClr val="FF0000"/>
+              </a:solidFill>
+            </a:endParaRPr>
+          </a:p>
+        </p:txBody>
+      </p:sp>
+      <p:sp>
+        <p:nvSpPr>
+          <p:cNvPr id="13" name="TextBox 12"/>
+          <p:cNvSpPr txBox="1"/>
+          <p:nvPr/>
+        </p:nvSpPr>
+        <p:spPr>
+          <a:xfrm>
+            <a:off x="3888303" y="4730262"/>
+            <a:ext cx="1735382" cy="523220"/>
+          </a:xfrm>
+          <a:prstGeom prst="rect">
+            <a:avLst/>
+          </a:prstGeom>
+          <a:noFill/>
+        </p:spPr>
+        <p:txBody>
+          <a:bodyPr wrap="square" rtlCol="0">
+            <a:spAutoFit/>
+          </a:bodyPr>
+          <a:lstStyle/>
+          <a:p>
+            <a:r>
+              <a:rPr lang="en-US" altLang="ko-KR" sz="1400" b="1" dirty="0" smtClean="0">
+                <a:solidFill>
+                  <a:srgbClr val="FF0000"/>
+                </a:solidFill>
+              </a:rPr>
+              <a:t>Target update</a:t>
+            </a:r>
+          </a:p>
+          <a:p>
+            <a:r>
+              <a:rPr lang="en-US" altLang="ko-KR" sz="1400" b="1" dirty="0" smtClean="0">
+                <a:solidFill>
+                  <a:srgbClr val="FF0000"/>
+                </a:solidFill>
+              </a:rPr>
+              <a:t>(Q-learning)</a:t>
+            </a:r>
+            <a:endParaRPr lang="ko-KR" altLang="en-US" sz="1400" b="1" dirty="0">
+              <a:solidFill>
+                <a:srgbClr val="FF0000"/>
+              </a:solidFill>
+            </a:endParaRPr>
+          </a:p>
+        </p:txBody>
+      </p:sp>
+      <p:sp>
+        <p:nvSpPr>
+          <p:cNvPr id="14" name="TextBox 13"/>
+          <p:cNvSpPr txBox="1"/>
+          <p:nvPr/>
+        </p:nvSpPr>
+        <p:spPr>
+          <a:xfrm>
+            <a:off x="4631899" y="5430089"/>
+            <a:ext cx="1399624" cy="523220"/>
+          </a:xfrm>
+          <a:prstGeom prst="rect">
+            <a:avLst/>
+          </a:prstGeom>
+          <a:noFill/>
+        </p:spPr>
+        <p:txBody>
+          <a:bodyPr wrap="square" rtlCol="0">
+            <a:spAutoFit/>
+          </a:bodyPr>
+          <a:lstStyle/>
+          <a:p>
+            <a:r>
+              <a:rPr lang="en-US" altLang="ko-KR" sz="1400" b="1" dirty="0" smtClean="0">
+                <a:solidFill>
+                  <a:srgbClr val="FF0000"/>
+                </a:solidFill>
+              </a:rPr>
+              <a:t>Update</a:t>
+            </a:r>
+          </a:p>
+          <a:p>
+            <a:r>
+              <a:rPr lang="en-US" altLang="ko-KR" sz="1400" b="1" dirty="0" smtClean="0">
+                <a:solidFill>
+                  <a:srgbClr val="FF0000"/>
+                </a:solidFill>
+              </a:rPr>
+              <a:t>shared model</a:t>
+            </a:r>
+            <a:endParaRPr lang="ko-KR" altLang="en-US" sz="1400" b="1" dirty="0">
+              <a:solidFill>
+                <a:srgbClr val="FF0000"/>
+              </a:solidFill>
+            </a:endParaRPr>
+          </a:p>
+        </p:txBody>
+      </p:sp>
+      <p:sp>
+        <p:nvSpPr>
+          <p:cNvPr id="15" name="TextBox 14"/>
+          <p:cNvSpPr txBox="1"/>
+          <p:nvPr/>
+        </p:nvSpPr>
+        <p:spPr>
+          <a:xfrm>
+            <a:off x="8903850" y="1762780"/>
+            <a:ext cx="1735382" cy="307777"/>
+          </a:xfrm>
+          <a:prstGeom prst="rect">
+            <a:avLst/>
+          </a:prstGeom>
+          <a:noFill/>
+        </p:spPr>
+        <p:txBody>
+          <a:bodyPr wrap="square" rtlCol="0">
+            <a:spAutoFit/>
+          </a:bodyPr>
+          <a:lstStyle/>
+          <a:p>
+            <a:r>
+              <a:rPr lang="en-US" altLang="ko-KR" sz="1400" b="1" dirty="0" smtClean="0">
+                <a:solidFill>
+                  <a:srgbClr val="FF0000"/>
+                </a:solidFill>
+              </a:rPr>
+              <a:t>Shared models</a:t>
+            </a:r>
+            <a:endParaRPr lang="ko-KR" altLang="en-US" sz="1400" b="1" dirty="0">
+              <a:solidFill>
+                <a:srgbClr val="FF0000"/>
+              </a:solidFill>
+            </a:endParaRPr>
+          </a:p>
+        </p:txBody>
+      </p:sp>
+      <p:sp>
+        <p:nvSpPr>
+          <p:cNvPr id="16" name="직사각형 15"/>
+          <p:cNvSpPr/>
+          <p:nvPr/>
+        </p:nvSpPr>
+        <p:spPr>
+          <a:xfrm>
+            <a:off x="5753101" y="2588496"/>
+            <a:ext cx="2634762" cy="140567"/>
+          </a:xfrm>
+          <a:prstGeom prst="rect">
+            <a:avLst/>
+          </a:prstGeom>
+          <a:noFill/>
+          <a:ln w="38100">
+            <a:solidFill>
+              <a:srgbClr val="FF0000"/>
+            </a:solidFill>
+          </a:ln>
+        </p:spPr>
+        <p:style>
+          <a:lnRef idx="2">
+            <a:schemeClr val="dk1"/>
+          </a:lnRef>
+          <a:fillRef idx="1">
+            <a:schemeClr val="lt1"/>
+          </a:fillRef>
+          <a:effectRef idx="0">
+            <a:schemeClr val="dk1"/>
+          </a:effectRef>
+          <a:fontRef idx="minor">
+            <a:schemeClr val="dk1"/>
+          </a:fontRef>
+        </p:style>
+        <p:txBody>
+          <a:bodyPr rtlCol="0" anchor="ctr"/>
+          <a:lstStyle/>
+          <a:p>
+            <a:pPr algn="ctr"/>
+            <a:endParaRPr lang="ko-KR" altLang="en-US"/>
+          </a:p>
+        </p:txBody>
+      </p:sp>
+      <p:sp>
+        <p:nvSpPr>
+          <p:cNvPr id="17" name="TextBox 16"/>
+          <p:cNvSpPr txBox="1"/>
+          <p:nvPr/>
+        </p:nvSpPr>
+        <p:spPr>
+          <a:xfrm>
+            <a:off x="8616462" y="2506725"/>
+            <a:ext cx="1735382" cy="307777"/>
+          </a:xfrm>
+          <a:prstGeom prst="rect">
+            <a:avLst/>
+          </a:prstGeom>
+          <a:noFill/>
+        </p:spPr>
+        <p:txBody>
+          <a:bodyPr wrap="square" rtlCol="0">
+            <a:spAutoFit/>
+          </a:bodyPr>
+          <a:lstStyle/>
+          <a:p>
+            <a:r>
+              <a:rPr lang="en-US" altLang="ko-KR" sz="1400" b="1" dirty="0" smtClean="0">
+                <a:solidFill>
+                  <a:srgbClr val="FF0000"/>
+                </a:solidFill>
+              </a:rPr>
+              <a:t>Each agent model</a:t>
+            </a:r>
+            <a:endParaRPr lang="ko-KR" altLang="en-US" sz="1400" b="1" dirty="0">
+              <a:solidFill>
+                <a:srgbClr val="FF0000"/>
+              </a:solidFill>
+            </a:endParaRPr>
+          </a:p>
+        </p:txBody>
+      </p:sp>
+      <p:sp>
+        <p:nvSpPr>
+          <p:cNvPr id="18" name="TextBox 17"/>
+          <p:cNvSpPr txBox="1"/>
+          <p:nvPr/>
+        </p:nvSpPr>
+        <p:spPr>
+          <a:xfrm>
+            <a:off x="8765932" y="3135936"/>
+            <a:ext cx="1735382" cy="307777"/>
+          </a:xfrm>
+          <a:prstGeom prst="rect">
+            <a:avLst/>
+          </a:prstGeom>
+          <a:noFill/>
+        </p:spPr>
+        <p:txBody>
+          <a:bodyPr wrap="square" rtlCol="0">
+            <a:spAutoFit/>
+          </a:bodyPr>
+          <a:lstStyle/>
+          <a:p>
+            <a:r>
+              <a:rPr lang="en-US" altLang="ko-KR" sz="1400" b="1" dirty="0" smtClean="0">
+                <a:solidFill>
+                  <a:srgbClr val="FF0000"/>
+                </a:solidFill>
+              </a:rPr>
+              <a:t>Synchronize</a:t>
+            </a:r>
+            <a:endParaRPr lang="ko-KR" altLang="en-US" sz="1400" b="1" dirty="0">
+              <a:solidFill>
+                <a:srgbClr val="FF0000"/>
+              </a:solidFill>
+            </a:endParaRPr>
+          </a:p>
+        </p:txBody>
+      </p:sp>
+      <p:sp>
+        <p:nvSpPr>
+          <p:cNvPr id="19" name="TextBox 18"/>
+          <p:cNvSpPr txBox="1"/>
+          <p:nvPr/>
+        </p:nvSpPr>
+        <p:spPr>
+          <a:xfrm>
+            <a:off x="9694412" y="4948548"/>
+            <a:ext cx="1005609" cy="738664"/>
+          </a:xfrm>
+          <a:prstGeom prst="rect">
+            <a:avLst/>
+          </a:prstGeom>
+          <a:noFill/>
+        </p:spPr>
+        <p:txBody>
+          <a:bodyPr wrap="square" rtlCol="0">
+            <a:spAutoFit/>
+          </a:bodyPr>
+          <a:lstStyle/>
+          <a:p>
+            <a:r>
+              <a:rPr lang="en-US" altLang="ko-KR" sz="1400" b="1" dirty="0" smtClean="0">
+                <a:solidFill>
+                  <a:srgbClr val="FF0000"/>
+                </a:solidFill>
+              </a:rPr>
+              <a:t>Update shared model</a:t>
+            </a:r>
+            <a:endParaRPr lang="ko-KR" altLang="en-US" sz="1400" b="1" dirty="0">
+              <a:solidFill>
+                <a:srgbClr val="FF0000"/>
+              </a:solidFill>
+            </a:endParaRPr>
+          </a:p>
+        </p:txBody>
+      </p:sp>
+      <p:sp>
+        <p:nvSpPr>
+          <p:cNvPr id="20" name="TextBox 19"/>
+          <p:cNvSpPr txBox="1"/>
+          <p:nvPr/>
+        </p:nvSpPr>
+        <p:spPr>
+          <a:xfrm>
+            <a:off x="7833946" y="5791983"/>
+            <a:ext cx="1453278" cy="523220"/>
+          </a:xfrm>
+          <a:prstGeom prst="rect">
+            <a:avLst/>
+          </a:prstGeom>
+          <a:noFill/>
+        </p:spPr>
+        <p:txBody>
+          <a:bodyPr wrap="square" rtlCol="0">
+            <a:spAutoFit/>
+          </a:bodyPr>
+          <a:lstStyle/>
+          <a:p>
+            <a:r>
+              <a:rPr lang="en-US" altLang="ko-KR" sz="1400" b="1" dirty="0" smtClean="0">
+                <a:solidFill>
+                  <a:srgbClr val="FF0000"/>
+                </a:solidFill>
+              </a:rPr>
+              <a:t>Target update</a:t>
+            </a:r>
+          </a:p>
+          <a:p>
+            <a:r>
+              <a:rPr lang="en-US" altLang="ko-KR" sz="1400" b="1" dirty="0" smtClean="0">
+                <a:solidFill>
+                  <a:srgbClr val="FF0000"/>
+                </a:solidFill>
+              </a:rPr>
+              <a:t>(Q-learning)</a:t>
+            </a:r>
+            <a:endParaRPr lang="ko-KR" altLang="en-US" sz="1400" b="1" dirty="0">
+              <a:solidFill>
+                <a:srgbClr val="FF0000"/>
+              </a:solidFill>
+            </a:endParaRPr>
+          </a:p>
+        </p:txBody>
+      </p:sp>
     </p:spTree>
     <p:extLst>
       <p:ext uri="{BB962C8B-B14F-4D97-AF65-F5344CB8AC3E}">

</xml_diff>